<commit_message>
next version of presentation/Machine learning in Azure without Python.pptx
</commit_message>
<xml_diff>
--- a/presentation/Machine learning in Azure without Python.pptx
+++ b/presentation/Machine learning in Azure without Python.pptx
@@ -5155,7 +5155,7 @@
         <p:spPr/>
         <p:txBody>
           <a:bodyPr>
-            <a:normAutofit fontScale="92500" lnSpcReduction="20000"/>
+            <a:normAutofit fontScale="92500"/>
           </a:bodyPr>
           <a:lstStyle/>
           <a:p>
@@ -5163,15 +5163,15 @@
               <a:buNone/>
             </a:pPr>
             <a:r>
-              <a:rPr lang="pl-PL" dirty="0" err="1"/>
+              <a:rPr lang="pl-PL" b="1" dirty="0" err="1"/>
               <a:t>L</a:t>
             </a:r>
             <a:r>
-              <a:rPr lang="pl-PL" dirty="0" err="1" smtClean="0"/>
+              <a:rPr lang="pl-PL" b="1" dirty="0" err="1" smtClean="0"/>
               <a:t>oad</a:t>
             </a:r>
             <a:r>
-              <a:rPr lang="pl-PL" dirty="0" smtClean="0"/>
+              <a:rPr lang="pl-PL" b="1" dirty="0" smtClean="0"/>
               <a:t> data</a:t>
             </a:r>
           </a:p>
@@ -5186,101 +5186,111 @@
               <a:buNone/>
             </a:pPr>
             <a:r>
-              <a:rPr lang="en-US" dirty="0" err="1"/>
+              <a:rPr lang="en-US" sz="2600" dirty="0" err="1"/>
               <a:t>MLContext</a:t>
             </a:r>
             <a:r>
-              <a:rPr lang="en-US" dirty="0"/>
+              <a:rPr lang="en-US" sz="2600" dirty="0"/>
               <a:t> </a:t>
             </a:r>
             <a:r>
-              <a:rPr lang="en-US" dirty="0" err="1"/>
+              <a:rPr lang="en-US" sz="2600" dirty="0" err="1"/>
               <a:t>mlContext</a:t>
             </a:r>
             <a:r>
-              <a:rPr lang="en-US" dirty="0"/>
+              <a:rPr lang="en-US" sz="2600" dirty="0"/>
               <a:t> = new </a:t>
             </a:r>
             <a:r>
-              <a:rPr lang="en-US" dirty="0" err="1" smtClean="0"/>
+              <a:rPr lang="en-US" sz="2600" dirty="0" err="1" smtClean="0"/>
               <a:t>MLContext</a:t>
             </a:r>
             <a:r>
-              <a:rPr lang="en-US" dirty="0" smtClean="0"/>
+              <a:rPr lang="en-US" sz="2600" dirty="0" smtClean="0"/>
               <a:t>();</a:t>
             </a:r>
-            <a:endParaRPr lang="en-US" dirty="0"/>
-          </a:p>
-          <a:p>
-            <a:pPr marL="0" indent="0">
-              <a:buNone/>
-            </a:pPr>
-            <a:endParaRPr lang="pl-PL" dirty="0"/>
-          </a:p>
-          <a:p>
-            <a:pPr marL="0" indent="0">
-              <a:buNone/>
-            </a:pPr>
-            <a:endParaRPr lang="pl-PL" dirty="0"/>
-          </a:p>
-          <a:p>
-            <a:pPr marL="0" indent="0">
-              <a:buNone/>
-            </a:pPr>
-            <a:r>
-              <a:rPr lang="en-US" dirty="0" err="1"/>
+            <a:endParaRPr lang="en-US" sz="2600" dirty="0"/>
+          </a:p>
+          <a:p>
+            <a:pPr marL="0" indent="0">
+              <a:buNone/>
+            </a:pPr>
+            <a:endParaRPr lang="pl-PL" sz="2600" dirty="0"/>
+          </a:p>
+          <a:p>
+            <a:pPr marL="0" indent="0">
+              <a:buNone/>
+            </a:pPr>
+            <a:endParaRPr lang="pl-PL" sz="2600" dirty="0"/>
+          </a:p>
+          <a:p>
+            <a:pPr marL="0" indent="0">
+              <a:buNone/>
+            </a:pPr>
+            <a:r>
+              <a:rPr lang="en-US" sz="2600" dirty="0" err="1"/>
               <a:t>IDataView</a:t>
             </a:r>
             <a:r>
-              <a:rPr lang="en-US" dirty="0"/>
+              <a:rPr lang="en-US" sz="2600" dirty="0"/>
               <a:t> </a:t>
             </a:r>
             <a:r>
-              <a:rPr lang="en-US" dirty="0" err="1"/>
+              <a:rPr lang="en-US" sz="2600" dirty="0" err="1"/>
               <a:t>dataView</a:t>
             </a:r>
             <a:r>
-              <a:rPr lang="en-US" dirty="0"/>
+              <a:rPr lang="en-US" sz="2600" dirty="0"/>
               <a:t> = </a:t>
             </a:r>
             <a:r>
-              <a:rPr lang="en-US" dirty="0" err="1"/>
+              <a:rPr lang="en-US" sz="2600" dirty="0" err="1"/>
               <a:t>mlContext.Data.LoadFromTextFile</a:t>
             </a:r>
             <a:r>
-              <a:rPr lang="en-US" dirty="0"/>
+              <a:rPr lang="en-US" sz="2600" dirty="0"/>
               <a:t>&lt;</a:t>
             </a:r>
             <a:r>
-              <a:rPr lang="en-US" dirty="0" err="1"/>
+              <a:rPr lang="en-US" sz="2600" dirty="0" err="1"/>
               <a:t>ModelInput</a:t>
             </a:r>
             <a:r>
-              <a:rPr lang="en-US" dirty="0"/>
-              <a:t>&gt;(</a:t>
-            </a:r>
-            <a:r>
-              <a:rPr lang="en-US" dirty="0" err="1"/>
+              <a:rPr lang="en-US" sz="2600" dirty="0" smtClean="0"/>
+              <a:t>&gt;</a:t>
+            </a:r>
+            <a:endParaRPr lang="pl-PL" sz="2600" dirty="0" smtClean="0"/>
+          </a:p>
+          <a:p>
+            <a:pPr marL="0" indent="0">
+              <a:buNone/>
+            </a:pPr>
+            <a:r>
+              <a:rPr lang="en-US" sz="2600" dirty="0" smtClean="0"/>
+              <a:t>(</a:t>
+            </a:r>
+            <a:r>
+              <a:rPr lang="en-US" sz="2600" dirty="0" err="1"/>
               <a:t>dataPath</a:t>
             </a:r>
             <a:r>
-              <a:rPr lang="en-US" dirty="0"/>
+              <a:rPr lang="en-US" sz="2600" dirty="0"/>
               <a:t>, </a:t>
             </a:r>
             <a:r>
-              <a:rPr lang="en-US" dirty="0" err="1"/>
+              <a:rPr lang="en-US" sz="2600" dirty="0" err="1"/>
               <a:t>hasHeader</a:t>
             </a:r>
             <a:r>
-              <a:rPr lang="en-US" dirty="0"/>
+              <a:rPr lang="en-US" sz="2600" dirty="0"/>
               <a:t>: true, </a:t>
             </a:r>
             <a:r>
-              <a:rPr lang="en-US" dirty="0" err="1"/>
+              <a:rPr lang="en-US" sz="2600" dirty="0" err="1"/>
               <a:t>separatorChar</a:t>
             </a:r>
             <a:r>
-              <a:rPr lang="en-US" dirty="0"/>
+              <a:rPr lang="en-US" sz="2600" dirty="0"/>
               <a:t>: ',');</a:t>
             </a:r>
           </a:p>
@@ -9404,13 +9414,21 @@
         <p:spPr/>
         <p:txBody>
           <a:bodyPr>
-            <a:normAutofit fontScale="90000"/>
+            <a:normAutofit/>
           </a:bodyPr>
           <a:lstStyle/>
           <a:p>
             <a:r>
               <a:rPr lang="pl-PL" dirty="0" smtClean="0"/>
-              <a:t>ML.NET PIPELINE CONSUME USE MODE</a:t>
+              <a:t>ML.NET PIPELINE </a:t>
+            </a:r>
+            <a:r>
+              <a:rPr lang="pl-PL" dirty="0" smtClean="0"/>
+              <a:t>USE </a:t>
+            </a:r>
+            <a:r>
+              <a:rPr lang="pl-PL" dirty="0" smtClean="0"/>
+              <a:t>MODE</a:t>
             </a:r>
             <a:endParaRPr lang="en-US" dirty="0"/>
           </a:p>
@@ -9522,13 +9540,25 @@
         <p:spPr/>
         <p:txBody>
           <a:bodyPr>
-            <a:normAutofit fontScale="90000"/>
+            <a:normAutofit/>
           </a:bodyPr>
           <a:lstStyle/>
           <a:p>
             <a:r>
               <a:rPr lang="pl-PL" dirty="0" smtClean="0"/>
-              <a:t>ML.NET PIPELINE BUILD MODEL</a:t>
+              <a:t>ML.NET PIPELINE </a:t>
+            </a:r>
+            <a:r>
+              <a:rPr lang="pl-PL" dirty="0" smtClean="0"/>
+              <a:t>USE</a:t>
+            </a:r>
+            <a:r>
+              <a:rPr lang="pl-PL" dirty="0" smtClean="0"/>
+              <a:t> </a:t>
+            </a:r>
+            <a:r>
+              <a:rPr lang="pl-PL" dirty="0" smtClean="0"/>
+              <a:t>MODEL</a:t>
             </a:r>
             <a:endParaRPr lang="en-US" dirty="0"/>
           </a:p>
@@ -9693,12 +9723,16 @@
               <a:t> </a:t>
             </a:r>
             <a:r>
-              <a:rPr lang="en-US" dirty="0" err="1"/>
-              <a:t>trainedModel</a:t>
+              <a:rPr lang="pl-PL" dirty="0" smtClean="0"/>
+              <a:t>model</a:t>
+            </a:r>
+            <a:r>
+              <a:rPr lang="en-US" dirty="0" smtClean="0"/>
+              <a:t> </a:t>
             </a:r>
             <a:r>
               <a:rPr lang="en-US" dirty="0"/>
-              <a:t> = </a:t>
+              <a:t>= </a:t>
             </a:r>
             <a:r>
               <a:rPr lang="en-US" dirty="0" err="1"/>
@@ -9769,13 +9803,17 @@
         <p:spPr/>
         <p:txBody>
           <a:bodyPr>
-            <a:normAutofit fontScale="90000"/>
+            <a:normAutofit/>
           </a:bodyPr>
           <a:lstStyle/>
           <a:p>
             <a:r>
               <a:rPr lang="pl-PL" dirty="0" smtClean="0"/>
-              <a:t>ML.NET PIPELINE BUILD MODEL</a:t>
+              <a:t>ML.NET PIPELINE </a:t>
+            </a:r>
+            <a:r>
+              <a:rPr lang="pl-PL" dirty="0" smtClean="0"/>
+              <a:t>USE MODEL</a:t>
             </a:r>
             <a:endParaRPr lang="en-US" dirty="0"/>
           </a:p>
@@ -13238,7 +13276,9 @@
           </a:xfrm>
         </p:spPr>
         <p:txBody>
-          <a:bodyPr/>
+          <a:bodyPr>
+            <a:normAutofit fontScale="92500" lnSpcReduction="20000"/>
+          </a:bodyPr>
           <a:lstStyle/>
           <a:p>
             <a:pPr marL="0" indent="0">
@@ -13421,6 +13461,48 @@
             <a:r>
               <a:rPr lang="pl-PL" dirty="0" smtClean="0"/>
               <a:t>.</a:t>
+            </a:r>
+          </a:p>
+          <a:p>
+            <a:pPr marL="514350" indent="-514350">
+              <a:buFont typeface="+mj-lt"/>
+              <a:buAutoNum type="arabicPeriod"/>
+            </a:pPr>
+            <a:r>
+              <a:rPr lang="pl-PL" dirty="0" err="1" smtClean="0"/>
+              <a:t>Make</a:t>
+            </a:r>
+            <a:r>
+              <a:rPr lang="pl-PL" dirty="0" smtClean="0"/>
+              <a:t> </a:t>
+            </a:r>
+            <a:r>
+              <a:rPr lang="pl-PL" dirty="0" err="1" smtClean="0"/>
+              <a:t>stress</a:t>
+            </a:r>
+            <a:r>
+              <a:rPr lang="pl-PL" dirty="0" smtClean="0"/>
+              <a:t> test to </a:t>
+            </a:r>
+            <a:r>
+              <a:rPr lang="pl-PL" dirty="0" err="1" smtClean="0"/>
+              <a:t>check</a:t>
+            </a:r>
+            <a:r>
+              <a:rPr lang="pl-PL" dirty="0" smtClean="0"/>
+              <a:t> </a:t>
+            </a:r>
+            <a:r>
+              <a:rPr lang="pl-PL" dirty="0" err="1" smtClean="0"/>
+              <a:t>different</a:t>
+            </a:r>
+            <a:r>
+              <a:rPr lang="pl-PL" dirty="0" smtClean="0"/>
+              <a:t> </a:t>
+            </a:r>
+            <a:r>
+              <a:rPr lang="pl-PL" dirty="0" err="1" smtClean="0"/>
+              <a:t>scenarios</a:t>
             </a:r>
             <a:endParaRPr lang="en-US" dirty="0"/>
           </a:p>
@@ -14292,8 +14374,101 @@
               <a:buNone/>
             </a:pPr>
             <a:r>
+              <a:rPr lang="pl-PL" sz="1200" b="1" dirty="0" err="1">
+                <a:solidFill>
+                  <a:srgbClr val="FF0000"/>
+                </a:solidFill>
+              </a:rPr>
+              <a:t>IDataView</a:t>
+            </a:r>
+            <a:r>
+              <a:rPr lang="pl-PL" sz="1200" dirty="0">
+                <a:solidFill>
+                  <a:srgbClr val="FF0000"/>
+                </a:solidFill>
+              </a:rPr>
+              <a:t> </a:t>
+            </a:r>
+            <a:r>
               <a:rPr lang="pl-PL" sz="1200" dirty="0" err="1"/>
-              <a:t>IDataView</a:t>
+              <a:t>dataReader</a:t>
+            </a:r>
+            <a:r>
+              <a:rPr lang="pl-PL" sz="1200" dirty="0"/>
+              <a:t> = </a:t>
+            </a:r>
+            <a:r>
+              <a:rPr lang="pl-PL" sz="1200" dirty="0" err="1"/>
+              <a:t>ctx.Data</a:t>
+            </a:r>
+            <a:endParaRPr lang="pl-PL" sz="1200" dirty="0"/>
+          </a:p>
+          <a:p>
+            <a:pPr marL="0" indent="0">
+              <a:buNone/>
+            </a:pPr>
+            <a:r>
+              <a:rPr lang="pl-PL" sz="1200" dirty="0"/>
+              <a:t>    .</a:t>
+            </a:r>
+            <a:r>
+              <a:rPr lang="pl-PL" sz="1200" b="1" dirty="0" err="1"/>
+              <a:t>LoadFromTextFile</a:t>
+            </a:r>
+            <a:r>
+              <a:rPr lang="pl-PL" sz="1200" dirty="0"/>
+              <a:t>&lt;</a:t>
+            </a:r>
+            <a:r>
+              <a:rPr lang="pl-PL" sz="1200" dirty="0" err="1"/>
+              <a:t>MyInput</a:t>
+            </a:r>
+            <a:r>
+              <a:rPr lang="pl-PL" sz="1200" dirty="0"/>
+              <a:t>&gt;(</a:t>
+            </a:r>
+            <a:r>
+              <a:rPr lang="pl-PL" sz="1200" dirty="0" err="1"/>
+              <a:t>dataPath</a:t>
+            </a:r>
+            <a:r>
+              <a:rPr lang="pl-PL" sz="1200" dirty="0"/>
+              <a:t>, </a:t>
+            </a:r>
+            <a:r>
+              <a:rPr lang="pl-PL" sz="1200" dirty="0" err="1"/>
+              <a:t>hasHeader</a:t>
+            </a:r>
+            <a:r>
+              <a:rPr lang="pl-PL" sz="1200" dirty="0"/>
+              <a:t>: </a:t>
+            </a:r>
+            <a:r>
+              <a:rPr lang="pl-PL" sz="1200" dirty="0" err="1"/>
+              <a:t>true</a:t>
+            </a:r>
+            <a:r>
+              <a:rPr lang="pl-PL" sz="1200" dirty="0"/>
+              <a:t>);</a:t>
+            </a:r>
+          </a:p>
+          <a:p>
+            <a:pPr marL="0" indent="0">
+              <a:buNone/>
+            </a:pPr>
+            <a:endParaRPr lang="pl-PL" sz="1200" dirty="0"/>
+          </a:p>
+          <a:p>
+            <a:pPr marL="0" indent="0">
+              <a:buNone/>
+            </a:pPr>
+            <a:r>
+              <a:rPr lang="pl-PL" sz="1200" dirty="0"/>
+              <a:t>//Step 3. </a:t>
+            </a:r>
+            <a:r>
+              <a:rPr lang="pl-PL" sz="1200" dirty="0" err="1"/>
+              <a:t>Build</a:t>
             </a:r>
             <a:r>
               <a:rPr lang="pl-PL" sz="1200" dirty="0"/>
@@ -14301,7 +14476,45 @@
             </a:r>
             <a:r>
               <a:rPr lang="pl-PL" sz="1200" dirty="0" err="1"/>
-              <a:t>dataReader</a:t>
+              <a:t>your</a:t>
+            </a:r>
+            <a:r>
+              <a:rPr lang="pl-PL" sz="1200" dirty="0"/>
+              <a:t> </a:t>
+            </a:r>
+            <a:r>
+              <a:rPr lang="pl-PL" sz="1200" dirty="0" err="1"/>
+              <a:t>estimator</a:t>
+            </a:r>
+            <a:endParaRPr lang="pl-PL" sz="1200" dirty="0"/>
+          </a:p>
+          <a:p>
+            <a:pPr marL="0" indent="0">
+              <a:buNone/>
+            </a:pPr>
+            <a:r>
+              <a:rPr lang="pl-PL" sz="1200" b="1" dirty="0" err="1">
+                <a:solidFill>
+                  <a:srgbClr val="FF0000"/>
+                </a:solidFill>
+              </a:rPr>
+              <a:t>IEstimator</a:t>
+            </a:r>
+            <a:r>
+              <a:rPr lang="pl-PL" sz="1200" dirty="0"/>
+              <a:t>&lt;</a:t>
+            </a:r>
+            <a:r>
+              <a:rPr lang="pl-PL" sz="1200" dirty="0" err="1"/>
+              <a:t>ITransformer</a:t>
+            </a:r>
+            <a:r>
+              <a:rPr lang="pl-PL" sz="1200" dirty="0"/>
+              <a:t>&gt; </a:t>
+            </a:r>
+            <a:r>
+              <a:rPr lang="pl-PL" sz="1200" dirty="0" err="1"/>
+              <a:t>est</a:t>
             </a:r>
             <a:r>
               <a:rPr lang="pl-PL" sz="1200" dirty="0"/>
@@ -14309,7 +14522,7 @@
             </a:r>
             <a:r>
               <a:rPr lang="pl-PL" sz="1200" dirty="0" err="1"/>
-              <a:t>ctx.Data</a:t>
+              <a:t>ctx.Transforms.Text</a:t>
             </a:r>
             <a:endParaRPr lang="pl-PL" sz="1200" dirty="0"/>
           </a:p>
@@ -14322,44 +14535,91 @@
               <a:t>    .</a:t>
             </a:r>
             <a:r>
+              <a:rPr lang="pl-PL" sz="1200" dirty="0" err="1"/>
+              <a:t>FeaturizeText</a:t>
+            </a:r>
+            <a:r>
+              <a:rPr lang="pl-PL" sz="1200" dirty="0"/>
+              <a:t>("</a:t>
+            </a:r>
+            <a:r>
+              <a:rPr lang="pl-PL" sz="1200" dirty="0" err="1"/>
+              <a:t>Features</a:t>
+            </a:r>
+            <a:r>
+              <a:rPr lang="pl-PL" sz="1200" dirty="0"/>
+              <a:t>", </a:t>
+            </a:r>
+            <a:r>
+              <a:rPr lang="pl-PL" sz="1200" dirty="0" err="1"/>
+              <a:t>nameof</a:t>
+            </a:r>
+            <a:r>
+              <a:rPr lang="pl-PL" sz="1200" dirty="0"/>
+              <a:t>(</a:t>
+            </a:r>
+            <a:r>
+              <a:rPr lang="pl-PL" sz="1200" dirty="0" err="1"/>
+              <a:t>SentimentIssue.Text</a:t>
+            </a:r>
+            <a:r>
+              <a:rPr lang="pl-PL" sz="1200" dirty="0"/>
+              <a:t>))</a:t>
+            </a:r>
+          </a:p>
+          <a:p>
+            <a:pPr marL="0" indent="0">
+              <a:buNone/>
+            </a:pPr>
+            <a:r>
+              <a:rPr lang="pl-PL" sz="1200" dirty="0"/>
+              <a:t>    .</a:t>
+            </a:r>
+            <a:r>
               <a:rPr lang="pl-PL" sz="1200" b="1" dirty="0" err="1"/>
-              <a:t>LoadFromTextFile</a:t>
+              <a:t>Append</a:t>
             </a:r>
             <a:r>
               <a:rPr lang="pl-PL" sz="1200" dirty="0"/>
-              <a:t>&lt;</a:t>
+              <a:t>(</a:t>
             </a:r>
             <a:r>
               <a:rPr lang="pl-PL" sz="1200" dirty="0" err="1"/>
-              <a:t>MyInput</a:t>
-            </a:r>
+              <a:t>ctx.BinaryClassification.Trainers</a:t>
+            </a:r>
+            <a:endParaRPr lang="pl-PL" sz="1200" dirty="0"/>
+          </a:p>
+          <a:p>
+            <a:pPr marL="0" indent="0">
+              <a:buNone/>
+            </a:pPr>
             <a:r>
               <a:rPr lang="pl-PL" sz="1200" dirty="0"/>
-              <a:t>&gt;(</a:t>
+              <a:t>        .</a:t>
             </a:r>
             <a:r>
               <a:rPr lang="pl-PL" sz="1200" dirty="0" err="1"/>
-              <a:t>dataPath</a:t>
+              <a:t>LbfgsLogisticRegression</a:t>
             </a:r>
             <a:r>
               <a:rPr lang="pl-PL" sz="1200" dirty="0"/>
-              <a:t>, </a:t>
+              <a:t>("</a:t>
             </a:r>
             <a:r>
               <a:rPr lang="pl-PL" sz="1200" dirty="0" err="1"/>
-              <a:t>hasHeader</a:t>
+              <a:t>Label</a:t>
             </a:r>
             <a:r>
               <a:rPr lang="pl-PL" sz="1200" dirty="0"/>
-              <a:t>: </a:t>
+              <a:t>", "</a:t>
             </a:r>
             <a:r>
               <a:rPr lang="pl-PL" sz="1200" dirty="0" err="1"/>
-              <a:t>true</a:t>
+              <a:t>Features</a:t>
             </a:r>
             <a:r>
               <a:rPr lang="pl-PL" sz="1200" dirty="0"/>
-              <a:t>);</a:t>
+              <a:t>"));</a:t>
             </a:r>
           </a:p>
           <a:p>
@@ -14374,15 +14634,7 @@
             </a:pPr>
             <a:r>
               <a:rPr lang="pl-PL" sz="1200" dirty="0"/>
-              <a:t>//Step 3. </a:t>
-            </a:r>
-            <a:r>
-              <a:rPr lang="pl-PL" sz="1200" dirty="0" err="1"/>
-              <a:t>Build</a:t>
-            </a:r>
-            <a:r>
-              <a:rPr lang="pl-PL" sz="1200" dirty="0"/>
-              <a:t> </a:t>
+              <a:t>//Step 4. Train </a:t>
             </a:r>
             <a:r>
               <a:rPr lang="pl-PL" sz="1200" dirty="0" err="1"/>
@@ -14390,177 +14642,27 @@
             </a:r>
             <a:r>
               <a:rPr lang="pl-PL" sz="1200" dirty="0"/>
-              <a:t> </a:t>
-            </a:r>
-            <a:r>
-              <a:rPr lang="pl-PL" sz="1200" dirty="0" err="1"/>
-              <a:t>estimator</a:t>
-            </a:r>
-            <a:endParaRPr lang="pl-PL" sz="1200" dirty="0"/>
-          </a:p>
-          <a:p>
-            <a:pPr marL="0" indent="0">
-              <a:buNone/>
-            </a:pPr>
-            <a:r>
-              <a:rPr lang="pl-PL" sz="1200" dirty="0" err="1"/>
-              <a:t>IEstimator</a:t>
-            </a:r>
-            <a:r>
-              <a:rPr lang="pl-PL" sz="1200" dirty="0"/>
-              <a:t>&lt;</a:t>
-            </a:r>
-            <a:r>
-              <a:rPr lang="pl-PL" sz="1200" dirty="0" err="1"/>
+              <a:t> Model</a:t>
+            </a:r>
+          </a:p>
+          <a:p>
+            <a:pPr marL="0" indent="0">
+              <a:buNone/>
+            </a:pPr>
+            <a:r>
+              <a:rPr lang="pl-PL" sz="1200" b="1" dirty="0" err="1">
+                <a:solidFill>
+                  <a:srgbClr val="FF0000"/>
+                </a:solidFill>
+              </a:rPr>
               <a:t>ITransformer</a:t>
             </a:r>
             <a:r>
-              <a:rPr lang="pl-PL" sz="1200" dirty="0"/>
-              <a:t>&gt; </a:t>
-            </a:r>
-            <a:r>
-              <a:rPr lang="pl-PL" sz="1200" dirty="0" err="1"/>
-              <a:t>est</a:t>
-            </a:r>
-            <a:r>
-              <a:rPr lang="pl-PL" sz="1200" dirty="0"/>
-              <a:t> = </a:t>
-            </a:r>
-            <a:r>
-              <a:rPr lang="pl-PL" sz="1200" dirty="0" err="1"/>
-              <a:t>ctx.Transforms.Text</a:t>
-            </a:r>
-            <a:endParaRPr lang="pl-PL" sz="1200" dirty="0"/>
-          </a:p>
-          <a:p>
-            <a:pPr marL="0" indent="0">
-              <a:buNone/>
-            </a:pPr>
-            <a:r>
-              <a:rPr lang="pl-PL" sz="1200" dirty="0"/>
-              <a:t>    .</a:t>
-            </a:r>
-            <a:r>
-              <a:rPr lang="pl-PL" sz="1200" dirty="0" err="1"/>
-              <a:t>FeaturizeText</a:t>
-            </a:r>
-            <a:r>
-              <a:rPr lang="pl-PL" sz="1200" dirty="0"/>
-              <a:t>("</a:t>
-            </a:r>
-            <a:r>
-              <a:rPr lang="pl-PL" sz="1200" dirty="0" err="1"/>
-              <a:t>Features</a:t>
-            </a:r>
-            <a:r>
-              <a:rPr lang="pl-PL" sz="1200" dirty="0"/>
-              <a:t>", </a:t>
-            </a:r>
-            <a:r>
-              <a:rPr lang="pl-PL" sz="1200" dirty="0" err="1"/>
-              <a:t>nameof</a:t>
-            </a:r>
-            <a:r>
-              <a:rPr lang="pl-PL" sz="1200" dirty="0"/>
-              <a:t>(</a:t>
-            </a:r>
-            <a:r>
-              <a:rPr lang="pl-PL" sz="1200" dirty="0" err="1"/>
-              <a:t>SentimentIssue.Text</a:t>
-            </a:r>
-            <a:r>
-              <a:rPr lang="pl-PL" sz="1200" dirty="0"/>
-              <a:t>))</a:t>
-            </a:r>
-          </a:p>
-          <a:p>
-            <a:pPr marL="0" indent="0">
-              <a:buNone/>
-            </a:pPr>
-            <a:r>
-              <a:rPr lang="pl-PL" sz="1200" dirty="0"/>
-              <a:t>    .</a:t>
-            </a:r>
-            <a:r>
-              <a:rPr lang="pl-PL" sz="1200" b="1" dirty="0" err="1"/>
-              <a:t>Append</a:t>
-            </a:r>
-            <a:r>
-              <a:rPr lang="pl-PL" sz="1200" dirty="0"/>
-              <a:t>(</a:t>
-            </a:r>
-            <a:r>
-              <a:rPr lang="pl-PL" sz="1200" dirty="0" err="1"/>
-              <a:t>ctx.BinaryClassification.Trainers</a:t>
-            </a:r>
-            <a:endParaRPr lang="pl-PL" sz="1200" dirty="0"/>
-          </a:p>
-          <a:p>
-            <a:pPr marL="0" indent="0">
-              <a:buNone/>
-            </a:pPr>
-            <a:r>
-              <a:rPr lang="pl-PL" sz="1200" dirty="0"/>
-              <a:t>        .</a:t>
-            </a:r>
-            <a:r>
-              <a:rPr lang="pl-PL" sz="1200" dirty="0" err="1"/>
-              <a:t>LbfgsLogisticRegression</a:t>
-            </a:r>
-            <a:r>
-              <a:rPr lang="pl-PL" sz="1200" dirty="0"/>
-              <a:t>("</a:t>
-            </a:r>
-            <a:r>
-              <a:rPr lang="pl-PL" sz="1200" dirty="0" err="1"/>
-              <a:t>Label</a:t>
-            </a:r>
-            <a:r>
-              <a:rPr lang="pl-PL" sz="1200" dirty="0"/>
-              <a:t>", "</a:t>
-            </a:r>
-            <a:r>
-              <a:rPr lang="pl-PL" sz="1200" dirty="0" err="1"/>
-              <a:t>Features</a:t>
-            </a:r>
-            <a:r>
-              <a:rPr lang="pl-PL" sz="1200" dirty="0"/>
-              <a:t>"));</a:t>
-            </a:r>
-          </a:p>
-          <a:p>
-            <a:pPr marL="0" indent="0">
-              <a:buNone/>
-            </a:pPr>
-            <a:endParaRPr lang="pl-PL" sz="1200" dirty="0"/>
-          </a:p>
-          <a:p>
-            <a:pPr marL="0" indent="0">
-              <a:buNone/>
-            </a:pPr>
-            <a:r>
-              <a:rPr lang="pl-PL" sz="1200" dirty="0"/>
-              <a:t>//Step 4. Train </a:t>
-            </a:r>
-            <a:r>
-              <a:rPr lang="pl-PL" sz="1200" dirty="0" err="1"/>
-              <a:t>your</a:t>
-            </a:r>
-            <a:r>
-              <a:rPr lang="pl-PL" sz="1200" dirty="0"/>
-              <a:t> Model</a:t>
-            </a:r>
-          </a:p>
-          <a:p>
-            <a:pPr marL="0" indent="0">
-              <a:buNone/>
-            </a:pPr>
-            <a:r>
-              <a:rPr lang="pl-PL" sz="1200" dirty="0" err="1"/>
-              <a:t>ITransformer</a:t>
-            </a:r>
-            <a:r>
-              <a:rPr lang="pl-PL" sz="1200" dirty="0"/>
+              <a:rPr lang="pl-PL" sz="1200" dirty="0">
+                <a:solidFill>
+                  <a:srgbClr val="FF0000"/>
+                </a:solidFill>
+              </a:rPr>
               <a:t> </a:t>
             </a:r>
             <a:r>

</xml_diff>